<commit_message>
agrego mas slides de cosas que charlamos
</commit_message>
<xml_diff>
--- a/presentacion/dia2.pptx
+++ b/presentacion/dia2.pptx
@@ -12,6 +12,13 @@
     <p:sldId id="257" r:id="rId7"/>
     <p:sldId id="258" r:id="rId8"/>
     <p:sldId id="259" r:id="rId9"/>
+    <p:sldId id="260" r:id="rId10"/>
+    <p:sldId id="261" r:id="rId11"/>
+    <p:sldId id="262" r:id="rId12"/>
+    <p:sldId id="263" r:id="rId13"/>
+    <p:sldId id="264" r:id="rId14"/>
+    <p:sldId id="265" r:id="rId15"/>
+    <p:sldId id="266" r:id="rId16"/>
   </p:sldIdLst>
   <p:sldSz cy="5143500" cx="9144000"/>
   <p:notesSz cx="6858000" cy="9144000"/>
@@ -482,6 +489,196 @@
 </p:notes>
 </file>
 
+<file path=ppt/notesSlides/notesSlide10.xml><?xml version="1.0" encoding="utf-8"?>
+<p:notes xmlns:a="http://schemas.openxmlformats.org/drawingml/2006/main" xmlns:r="http://schemas.openxmlformats.org/officeDocument/2006/relationships" xmlns:mc="http://schemas.openxmlformats.org/markup-compatibility/2006" xmlns:mv="urn:schemas-microsoft-com:mac:vml" xmlns:p="http://schemas.openxmlformats.org/presentationml/2006/main" xmlns:c="http://schemas.openxmlformats.org/drawingml/2006/chart" xmlns:dgm="http://schemas.openxmlformats.org/drawingml/2006/diagram" xmlns:o="urn:schemas-microsoft-com:office:office" xmlns:v="urn:schemas-microsoft-com:vml" xmlns:pvml="urn:schemas-microsoft-com:office:powerpoint" xmlns:com="http://schemas.openxmlformats.org/drawingml/2006/compatibility" xmlns:p14="http://schemas.microsoft.com/office/powerpoint/2010/main" xmlns:p15="http://schemas.microsoft.com/office/powerpoint/2012/main" showMasterPhAnim="0" showMasterSp="0">
+  <p:cSld>
+    <p:spTree>
+      <p:nvGrpSpPr>
+        <p:cNvPr id="105" name="Shape 105"/>
+        <p:cNvGrpSpPr/>
+        <p:nvPr/>
+      </p:nvGrpSpPr>
+      <p:grpSpPr>
+        <a:xfrm>
+          <a:off x="0" y="0"/>
+          <a:ext cx="0" cy="0"/>
+          <a:chOff x="0" y="0"/>
+          <a:chExt cx="0" cy="0"/>
+        </a:xfrm>
+      </p:grpSpPr>
+      <p:sp>
+        <p:nvSpPr>
+          <p:cNvPr id="106" name="Shape 106"/>
+          <p:cNvSpPr/>
+          <p:nvPr>
+            <p:ph idx="2" type="sldImg"/>
+          </p:nvPr>
+        </p:nvSpPr>
+        <p:spPr>
+          <a:xfrm>
+            <a:off x="381300" y="685800"/>
+            <a:ext cx="6096000" cy="3429000"/>
+          </a:xfrm>
+          <a:custGeom>
+            <a:pathLst>
+              <a:path extrusionOk="0" h="120000" w="120000">
+                <a:moveTo>
+                  <a:pt x="0" y="0"/>
+                </a:moveTo>
+                <a:lnTo>
+                  <a:pt x="120000" y="0"/>
+                </a:lnTo>
+                <a:lnTo>
+                  <a:pt x="120000" y="120000"/>
+                </a:lnTo>
+                <a:lnTo>
+                  <a:pt x="0" y="120000"/>
+                </a:lnTo>
+                <a:close/>
+              </a:path>
+            </a:pathLst>
+          </a:custGeom>
+        </p:spPr>
+      </p:sp>
+      <p:sp>
+        <p:nvSpPr>
+          <p:cNvPr id="107" name="Shape 107"/>
+          <p:cNvSpPr txBox="1"/>
+          <p:nvPr>
+            <p:ph idx="1" type="body"/>
+          </p:nvPr>
+        </p:nvSpPr>
+        <p:spPr>
+          <a:xfrm>
+            <a:off x="685800" y="4343400"/>
+            <a:ext cx="5486400" cy="4114800"/>
+          </a:xfrm>
+          <a:prstGeom prst="rect">
+            <a:avLst/>
+          </a:prstGeom>
+        </p:spPr>
+        <p:txBody>
+          <a:bodyPr anchorCtr="0" anchor="t" bIns="91425" lIns="91425" rIns="91425" wrap="square" tIns="91425">
+            <a:noAutofit/>
+          </a:bodyPr>
+          <a:lstStyle/>
+          <a:p>
+            <a:pPr lvl="0">
+              <a:spcBef>
+                <a:spcPts val="0"/>
+              </a:spcBef>
+              <a:buNone/>
+            </a:pPr>
+            <a:r>
+              <a:t/>
+            </a:r>
+            <a:endParaRPr/>
+          </a:p>
+        </p:txBody>
+      </p:sp>
+    </p:spTree>
+  </p:cSld>
+  <p:clrMapOvr>
+    <a:masterClrMapping/>
+  </p:clrMapOvr>
+</p:notes>
+</file>
+
+<file path=ppt/notesSlides/notesSlide11.xml><?xml version="1.0" encoding="utf-8"?>
+<p:notes xmlns:a="http://schemas.openxmlformats.org/drawingml/2006/main" xmlns:r="http://schemas.openxmlformats.org/officeDocument/2006/relationships" xmlns:mc="http://schemas.openxmlformats.org/markup-compatibility/2006" xmlns:mv="urn:schemas-microsoft-com:mac:vml" xmlns:p="http://schemas.openxmlformats.org/presentationml/2006/main" xmlns:c="http://schemas.openxmlformats.org/drawingml/2006/chart" xmlns:dgm="http://schemas.openxmlformats.org/drawingml/2006/diagram" xmlns:o="urn:schemas-microsoft-com:office:office" xmlns:v="urn:schemas-microsoft-com:vml" xmlns:pvml="urn:schemas-microsoft-com:office:powerpoint" xmlns:com="http://schemas.openxmlformats.org/drawingml/2006/compatibility" xmlns:p14="http://schemas.microsoft.com/office/powerpoint/2010/main" xmlns:p15="http://schemas.microsoft.com/office/powerpoint/2012/main" showMasterPhAnim="0" showMasterSp="0">
+  <p:cSld>
+    <p:spTree>
+      <p:nvGrpSpPr>
+        <p:cNvPr id="111" name="Shape 111"/>
+        <p:cNvGrpSpPr/>
+        <p:nvPr/>
+      </p:nvGrpSpPr>
+      <p:grpSpPr>
+        <a:xfrm>
+          <a:off x="0" y="0"/>
+          <a:ext cx="0" cy="0"/>
+          <a:chOff x="0" y="0"/>
+          <a:chExt cx="0" cy="0"/>
+        </a:xfrm>
+      </p:grpSpPr>
+      <p:sp>
+        <p:nvSpPr>
+          <p:cNvPr id="112" name="Shape 112"/>
+          <p:cNvSpPr/>
+          <p:nvPr>
+            <p:ph idx="2" type="sldImg"/>
+          </p:nvPr>
+        </p:nvSpPr>
+        <p:spPr>
+          <a:xfrm>
+            <a:off x="381300" y="685800"/>
+            <a:ext cx="6096000" cy="3429000"/>
+          </a:xfrm>
+          <a:custGeom>
+            <a:pathLst>
+              <a:path extrusionOk="0" h="120000" w="120000">
+                <a:moveTo>
+                  <a:pt x="0" y="0"/>
+                </a:moveTo>
+                <a:lnTo>
+                  <a:pt x="120000" y="0"/>
+                </a:lnTo>
+                <a:lnTo>
+                  <a:pt x="120000" y="120000"/>
+                </a:lnTo>
+                <a:lnTo>
+                  <a:pt x="0" y="120000"/>
+                </a:lnTo>
+                <a:close/>
+              </a:path>
+            </a:pathLst>
+          </a:custGeom>
+        </p:spPr>
+      </p:sp>
+      <p:sp>
+        <p:nvSpPr>
+          <p:cNvPr id="113" name="Shape 113"/>
+          <p:cNvSpPr txBox="1"/>
+          <p:nvPr>
+            <p:ph idx="1" type="body"/>
+          </p:nvPr>
+        </p:nvSpPr>
+        <p:spPr>
+          <a:xfrm>
+            <a:off x="685800" y="4343400"/>
+            <a:ext cx="5486400" cy="4114800"/>
+          </a:xfrm>
+          <a:prstGeom prst="rect">
+            <a:avLst/>
+          </a:prstGeom>
+        </p:spPr>
+        <p:txBody>
+          <a:bodyPr anchorCtr="0" anchor="t" bIns="91425" lIns="91425" rIns="91425" wrap="square" tIns="91425">
+            <a:noAutofit/>
+          </a:bodyPr>
+          <a:lstStyle/>
+          <a:p>
+            <a:pPr lvl="0">
+              <a:spcBef>
+                <a:spcPts val="0"/>
+              </a:spcBef>
+              <a:buNone/>
+            </a:pPr>
+            <a:r>
+              <a:t/>
+            </a:r>
+            <a:endParaRPr/>
+          </a:p>
+        </p:txBody>
+      </p:sp>
+    </p:spTree>
+  </p:cSld>
+  <p:clrMapOvr>
+    <a:masterClrMapping/>
+  </p:clrMapOvr>
+</p:notes>
+</file>
+
 <file path=ppt/notesSlides/notesSlide2.xml><?xml version="1.0" encoding="utf-8"?>
 <p:notes xmlns:a="http://schemas.openxmlformats.org/drawingml/2006/main" xmlns:r="http://schemas.openxmlformats.org/officeDocument/2006/relationships" xmlns:mc="http://schemas.openxmlformats.org/markup-compatibility/2006" xmlns:mv="urn:schemas-microsoft-com:mac:vml" xmlns:p="http://schemas.openxmlformats.org/presentationml/2006/main" xmlns:c="http://schemas.openxmlformats.org/drawingml/2006/chart" xmlns:dgm="http://schemas.openxmlformats.org/drawingml/2006/diagram" xmlns:o="urn:schemas-microsoft-com:office:office" xmlns:v="urn:schemas-microsoft-com:vml" xmlns:pvml="urn:schemas-microsoft-com:office:powerpoint" xmlns:com="http://schemas.openxmlformats.org/drawingml/2006/compatibility" xmlns:p14="http://schemas.microsoft.com/office/powerpoint/2010/main" xmlns:p15="http://schemas.microsoft.com/office/powerpoint/2012/main" showMasterPhAnim="0" showMasterSp="0">
   <p:cSld>
@@ -510,7 +707,7 @@
         <p:spPr>
           <a:xfrm>
             <a:off x="381300" y="685800"/>
-            <a:ext cx="6096075" cy="3429000"/>
+            <a:ext cx="6096000" cy="3429000"/>
           </a:xfrm>
           <a:custGeom>
             <a:pathLst>
@@ -582,7 +779,7 @@
   <p:cSld>
     <p:spTree>
       <p:nvGrpSpPr>
-        <p:cNvPr id="63" name="Shape 63"/>
+        <p:cNvPr id="62" name="Shape 62"/>
         <p:cNvGrpSpPr/>
         <p:nvPr/>
       </p:nvGrpSpPr>
@@ -596,7 +793,7 @@
       </p:grpSpPr>
       <p:sp>
         <p:nvSpPr>
-          <p:cNvPr id="64" name="Shape 64"/>
+          <p:cNvPr id="63" name="Shape 63"/>
           <p:cNvSpPr/>
           <p:nvPr>
             <p:ph idx="2" type="sldImg"/>
@@ -630,7 +827,7 @@
       </p:sp>
       <p:sp>
         <p:nvSpPr>
-          <p:cNvPr id="65" name="Shape 65"/>
+          <p:cNvPr id="64" name="Shape 64"/>
           <p:cNvSpPr txBox="1"/>
           <p:nvPr>
             <p:ph idx="1" type="body"/>
@@ -677,7 +874,7 @@
   <p:cSld>
     <p:spTree>
       <p:nvGrpSpPr>
-        <p:cNvPr id="70" name="Shape 70"/>
+        <p:cNvPr id="68" name="Shape 68"/>
         <p:cNvGrpSpPr/>
         <p:nvPr/>
       </p:nvGrpSpPr>
@@ -691,7 +888,7 @@
       </p:grpSpPr>
       <p:sp>
         <p:nvSpPr>
-          <p:cNvPr id="71" name="Shape 71"/>
+          <p:cNvPr id="69" name="Shape 69"/>
           <p:cNvSpPr/>
           <p:nvPr>
             <p:ph idx="2" type="sldImg"/>
@@ -700,7 +897,7 @@
         <p:spPr>
           <a:xfrm>
             <a:off x="381300" y="685800"/>
-            <a:ext cx="6096000" cy="3429000"/>
+            <a:ext cx="6096075" cy="3429000"/>
           </a:xfrm>
           <a:custGeom>
             <a:pathLst>
@@ -725,7 +922,482 @@
       </p:sp>
       <p:sp>
         <p:nvSpPr>
-          <p:cNvPr id="72" name="Shape 72"/>
+          <p:cNvPr id="70" name="Shape 70"/>
+          <p:cNvSpPr txBox="1"/>
+          <p:nvPr>
+            <p:ph idx="1" type="body"/>
+          </p:nvPr>
+        </p:nvSpPr>
+        <p:spPr>
+          <a:xfrm>
+            <a:off x="685800" y="4343400"/>
+            <a:ext cx="5486400" cy="4114800"/>
+          </a:xfrm>
+          <a:prstGeom prst="rect">
+            <a:avLst/>
+          </a:prstGeom>
+        </p:spPr>
+        <p:txBody>
+          <a:bodyPr anchorCtr="0" anchor="t" bIns="91425" lIns="91425" rIns="91425" wrap="square" tIns="91425">
+            <a:noAutofit/>
+          </a:bodyPr>
+          <a:lstStyle/>
+          <a:p>
+            <a:pPr lvl="0">
+              <a:spcBef>
+                <a:spcPts val="0"/>
+              </a:spcBef>
+              <a:buNone/>
+            </a:pPr>
+            <a:r>
+              <a:t/>
+            </a:r>
+            <a:endParaRPr/>
+          </a:p>
+        </p:txBody>
+      </p:sp>
+    </p:spTree>
+  </p:cSld>
+  <p:clrMapOvr>
+    <a:masterClrMapping/>
+  </p:clrMapOvr>
+</p:notes>
+</file>
+
+<file path=ppt/notesSlides/notesSlide5.xml><?xml version="1.0" encoding="utf-8"?>
+<p:notes xmlns:a="http://schemas.openxmlformats.org/drawingml/2006/main" xmlns:r="http://schemas.openxmlformats.org/officeDocument/2006/relationships" xmlns:mc="http://schemas.openxmlformats.org/markup-compatibility/2006" xmlns:mv="urn:schemas-microsoft-com:mac:vml" xmlns:p="http://schemas.openxmlformats.org/presentationml/2006/main" xmlns:c="http://schemas.openxmlformats.org/drawingml/2006/chart" xmlns:dgm="http://schemas.openxmlformats.org/drawingml/2006/diagram" xmlns:o="urn:schemas-microsoft-com:office:office" xmlns:v="urn:schemas-microsoft-com:vml" xmlns:pvml="urn:schemas-microsoft-com:office:powerpoint" xmlns:com="http://schemas.openxmlformats.org/drawingml/2006/compatibility" xmlns:p14="http://schemas.microsoft.com/office/powerpoint/2010/main" xmlns:p15="http://schemas.microsoft.com/office/powerpoint/2012/main" showMasterPhAnim="0" showMasterSp="0">
+  <p:cSld>
+    <p:spTree>
+      <p:nvGrpSpPr>
+        <p:cNvPr id="75" name="Shape 75"/>
+        <p:cNvGrpSpPr/>
+        <p:nvPr/>
+      </p:nvGrpSpPr>
+      <p:grpSpPr>
+        <a:xfrm>
+          <a:off x="0" y="0"/>
+          <a:ext cx="0" cy="0"/>
+          <a:chOff x="0" y="0"/>
+          <a:chExt cx="0" cy="0"/>
+        </a:xfrm>
+      </p:grpSpPr>
+      <p:sp>
+        <p:nvSpPr>
+          <p:cNvPr id="76" name="Shape 76"/>
+          <p:cNvSpPr/>
+          <p:nvPr>
+            <p:ph idx="2" type="sldImg"/>
+          </p:nvPr>
+        </p:nvSpPr>
+        <p:spPr>
+          <a:xfrm>
+            <a:off x="381300" y="685800"/>
+            <a:ext cx="6096000" cy="3429000"/>
+          </a:xfrm>
+          <a:custGeom>
+            <a:pathLst>
+              <a:path extrusionOk="0" h="120000" w="120000">
+                <a:moveTo>
+                  <a:pt x="0" y="0"/>
+                </a:moveTo>
+                <a:lnTo>
+                  <a:pt x="120000" y="0"/>
+                </a:lnTo>
+                <a:lnTo>
+                  <a:pt x="120000" y="120000"/>
+                </a:lnTo>
+                <a:lnTo>
+                  <a:pt x="0" y="120000"/>
+                </a:lnTo>
+                <a:close/>
+              </a:path>
+            </a:pathLst>
+          </a:custGeom>
+        </p:spPr>
+      </p:sp>
+      <p:sp>
+        <p:nvSpPr>
+          <p:cNvPr id="77" name="Shape 77"/>
+          <p:cNvSpPr txBox="1"/>
+          <p:nvPr>
+            <p:ph idx="1" type="body"/>
+          </p:nvPr>
+        </p:nvSpPr>
+        <p:spPr>
+          <a:xfrm>
+            <a:off x="685800" y="4343400"/>
+            <a:ext cx="5486400" cy="4114800"/>
+          </a:xfrm>
+          <a:prstGeom prst="rect">
+            <a:avLst/>
+          </a:prstGeom>
+        </p:spPr>
+        <p:txBody>
+          <a:bodyPr anchorCtr="0" anchor="t" bIns="91425" lIns="91425" rIns="91425" wrap="square" tIns="91425">
+            <a:noAutofit/>
+          </a:bodyPr>
+          <a:lstStyle/>
+          <a:p>
+            <a:pPr lvl="0" rtl="0">
+              <a:spcBef>
+                <a:spcPts val="0"/>
+              </a:spcBef>
+              <a:buNone/>
+            </a:pPr>
+            <a:r>
+              <a:t/>
+            </a:r>
+            <a:endParaRPr/>
+          </a:p>
+        </p:txBody>
+      </p:sp>
+    </p:spTree>
+  </p:cSld>
+  <p:clrMapOvr>
+    <a:masterClrMapping/>
+  </p:clrMapOvr>
+</p:notes>
+</file>
+
+<file path=ppt/notesSlides/notesSlide6.xml><?xml version="1.0" encoding="utf-8"?>
+<p:notes xmlns:a="http://schemas.openxmlformats.org/drawingml/2006/main" xmlns:r="http://schemas.openxmlformats.org/officeDocument/2006/relationships" xmlns:mc="http://schemas.openxmlformats.org/markup-compatibility/2006" xmlns:mv="urn:schemas-microsoft-com:mac:vml" xmlns:p="http://schemas.openxmlformats.org/presentationml/2006/main" xmlns:c="http://schemas.openxmlformats.org/drawingml/2006/chart" xmlns:dgm="http://schemas.openxmlformats.org/drawingml/2006/diagram" xmlns:o="urn:schemas-microsoft-com:office:office" xmlns:v="urn:schemas-microsoft-com:vml" xmlns:pvml="urn:schemas-microsoft-com:office:powerpoint" xmlns:com="http://schemas.openxmlformats.org/drawingml/2006/compatibility" xmlns:p14="http://schemas.microsoft.com/office/powerpoint/2010/main" xmlns:p15="http://schemas.microsoft.com/office/powerpoint/2012/main" showMasterPhAnim="0" showMasterSp="0">
+  <p:cSld>
+    <p:spTree>
+      <p:nvGrpSpPr>
+        <p:cNvPr id="81" name="Shape 81"/>
+        <p:cNvGrpSpPr/>
+        <p:nvPr/>
+      </p:nvGrpSpPr>
+      <p:grpSpPr>
+        <a:xfrm>
+          <a:off x="0" y="0"/>
+          <a:ext cx="0" cy="0"/>
+          <a:chOff x="0" y="0"/>
+          <a:chExt cx="0" cy="0"/>
+        </a:xfrm>
+      </p:grpSpPr>
+      <p:sp>
+        <p:nvSpPr>
+          <p:cNvPr id="82" name="Shape 82"/>
+          <p:cNvSpPr/>
+          <p:nvPr>
+            <p:ph idx="2" type="sldImg"/>
+          </p:nvPr>
+        </p:nvSpPr>
+        <p:spPr>
+          <a:xfrm>
+            <a:off x="381300" y="685800"/>
+            <a:ext cx="6096000" cy="3429000"/>
+          </a:xfrm>
+          <a:custGeom>
+            <a:pathLst>
+              <a:path extrusionOk="0" h="120000" w="120000">
+                <a:moveTo>
+                  <a:pt x="0" y="0"/>
+                </a:moveTo>
+                <a:lnTo>
+                  <a:pt x="120000" y="0"/>
+                </a:lnTo>
+                <a:lnTo>
+                  <a:pt x="120000" y="120000"/>
+                </a:lnTo>
+                <a:lnTo>
+                  <a:pt x="0" y="120000"/>
+                </a:lnTo>
+                <a:close/>
+              </a:path>
+            </a:pathLst>
+          </a:custGeom>
+        </p:spPr>
+      </p:sp>
+      <p:sp>
+        <p:nvSpPr>
+          <p:cNvPr id="83" name="Shape 83"/>
+          <p:cNvSpPr txBox="1"/>
+          <p:nvPr>
+            <p:ph idx="1" type="body"/>
+          </p:nvPr>
+        </p:nvSpPr>
+        <p:spPr>
+          <a:xfrm>
+            <a:off x="685800" y="4343400"/>
+            <a:ext cx="5486400" cy="4114800"/>
+          </a:xfrm>
+          <a:prstGeom prst="rect">
+            <a:avLst/>
+          </a:prstGeom>
+        </p:spPr>
+        <p:txBody>
+          <a:bodyPr anchorCtr="0" anchor="t" bIns="91425" lIns="91425" rIns="91425" wrap="square" tIns="91425">
+            <a:noAutofit/>
+          </a:bodyPr>
+          <a:lstStyle/>
+          <a:p>
+            <a:pPr lvl="0">
+              <a:spcBef>
+                <a:spcPts val="0"/>
+              </a:spcBef>
+              <a:buNone/>
+            </a:pPr>
+            <a:r>
+              <a:t/>
+            </a:r>
+            <a:endParaRPr/>
+          </a:p>
+        </p:txBody>
+      </p:sp>
+    </p:spTree>
+  </p:cSld>
+  <p:clrMapOvr>
+    <a:masterClrMapping/>
+  </p:clrMapOvr>
+</p:notes>
+</file>
+
+<file path=ppt/notesSlides/notesSlide7.xml><?xml version="1.0" encoding="utf-8"?>
+<p:notes xmlns:a="http://schemas.openxmlformats.org/drawingml/2006/main" xmlns:r="http://schemas.openxmlformats.org/officeDocument/2006/relationships" xmlns:mc="http://schemas.openxmlformats.org/markup-compatibility/2006" xmlns:mv="urn:schemas-microsoft-com:mac:vml" xmlns:p="http://schemas.openxmlformats.org/presentationml/2006/main" xmlns:c="http://schemas.openxmlformats.org/drawingml/2006/chart" xmlns:dgm="http://schemas.openxmlformats.org/drawingml/2006/diagram" xmlns:o="urn:schemas-microsoft-com:office:office" xmlns:v="urn:schemas-microsoft-com:vml" xmlns:pvml="urn:schemas-microsoft-com:office:powerpoint" xmlns:com="http://schemas.openxmlformats.org/drawingml/2006/compatibility" xmlns:p14="http://schemas.microsoft.com/office/powerpoint/2010/main" xmlns:p15="http://schemas.microsoft.com/office/powerpoint/2012/main" showMasterPhAnim="0" showMasterSp="0">
+  <p:cSld>
+    <p:spTree>
+      <p:nvGrpSpPr>
+        <p:cNvPr id="88" name="Shape 88"/>
+        <p:cNvGrpSpPr/>
+        <p:nvPr/>
+      </p:nvGrpSpPr>
+      <p:grpSpPr>
+        <a:xfrm>
+          <a:off x="0" y="0"/>
+          <a:ext cx="0" cy="0"/>
+          <a:chOff x="0" y="0"/>
+          <a:chExt cx="0" cy="0"/>
+        </a:xfrm>
+      </p:grpSpPr>
+      <p:sp>
+        <p:nvSpPr>
+          <p:cNvPr id="89" name="Shape 89"/>
+          <p:cNvSpPr/>
+          <p:nvPr>
+            <p:ph idx="2" type="sldImg"/>
+          </p:nvPr>
+        </p:nvSpPr>
+        <p:spPr>
+          <a:xfrm>
+            <a:off x="381300" y="685800"/>
+            <a:ext cx="6096000" cy="3429000"/>
+          </a:xfrm>
+          <a:custGeom>
+            <a:pathLst>
+              <a:path extrusionOk="0" h="120000" w="120000">
+                <a:moveTo>
+                  <a:pt x="0" y="0"/>
+                </a:moveTo>
+                <a:lnTo>
+                  <a:pt x="120000" y="0"/>
+                </a:lnTo>
+                <a:lnTo>
+                  <a:pt x="120000" y="120000"/>
+                </a:lnTo>
+                <a:lnTo>
+                  <a:pt x="0" y="120000"/>
+                </a:lnTo>
+                <a:close/>
+              </a:path>
+            </a:pathLst>
+          </a:custGeom>
+        </p:spPr>
+      </p:sp>
+      <p:sp>
+        <p:nvSpPr>
+          <p:cNvPr id="90" name="Shape 90"/>
+          <p:cNvSpPr txBox="1"/>
+          <p:nvPr>
+            <p:ph idx="1" type="body"/>
+          </p:nvPr>
+        </p:nvSpPr>
+        <p:spPr>
+          <a:xfrm>
+            <a:off x="685800" y="4343400"/>
+            <a:ext cx="5486400" cy="4114800"/>
+          </a:xfrm>
+          <a:prstGeom prst="rect">
+            <a:avLst/>
+          </a:prstGeom>
+        </p:spPr>
+        <p:txBody>
+          <a:bodyPr anchorCtr="0" anchor="t" bIns="91425" lIns="91425" rIns="91425" wrap="square" tIns="91425">
+            <a:noAutofit/>
+          </a:bodyPr>
+          <a:lstStyle/>
+          <a:p>
+            <a:pPr lvl="0">
+              <a:spcBef>
+                <a:spcPts val="0"/>
+              </a:spcBef>
+              <a:buNone/>
+            </a:pPr>
+            <a:r>
+              <a:t/>
+            </a:r>
+            <a:endParaRPr/>
+          </a:p>
+        </p:txBody>
+      </p:sp>
+    </p:spTree>
+  </p:cSld>
+  <p:clrMapOvr>
+    <a:masterClrMapping/>
+  </p:clrMapOvr>
+</p:notes>
+</file>
+
+<file path=ppt/notesSlides/notesSlide8.xml><?xml version="1.0" encoding="utf-8"?>
+<p:notes xmlns:a="http://schemas.openxmlformats.org/drawingml/2006/main" xmlns:r="http://schemas.openxmlformats.org/officeDocument/2006/relationships" xmlns:mc="http://schemas.openxmlformats.org/markup-compatibility/2006" xmlns:mv="urn:schemas-microsoft-com:mac:vml" xmlns:p="http://schemas.openxmlformats.org/presentationml/2006/main" xmlns:c="http://schemas.openxmlformats.org/drawingml/2006/chart" xmlns:dgm="http://schemas.openxmlformats.org/drawingml/2006/diagram" xmlns:o="urn:schemas-microsoft-com:office:office" xmlns:v="urn:schemas-microsoft-com:vml" xmlns:pvml="urn:schemas-microsoft-com:office:powerpoint" xmlns:com="http://schemas.openxmlformats.org/drawingml/2006/compatibility" xmlns:p14="http://schemas.microsoft.com/office/powerpoint/2010/main" xmlns:p15="http://schemas.microsoft.com/office/powerpoint/2012/main" showMasterPhAnim="0" showMasterSp="0">
+  <p:cSld>
+    <p:spTree>
+      <p:nvGrpSpPr>
+        <p:cNvPr id="94" name="Shape 94"/>
+        <p:cNvGrpSpPr/>
+        <p:nvPr/>
+      </p:nvGrpSpPr>
+      <p:grpSpPr>
+        <a:xfrm>
+          <a:off x="0" y="0"/>
+          <a:ext cx="0" cy="0"/>
+          <a:chOff x="0" y="0"/>
+          <a:chExt cx="0" cy="0"/>
+        </a:xfrm>
+      </p:grpSpPr>
+      <p:sp>
+        <p:nvSpPr>
+          <p:cNvPr id="95" name="Shape 95"/>
+          <p:cNvSpPr/>
+          <p:nvPr>
+            <p:ph idx="2" type="sldImg"/>
+          </p:nvPr>
+        </p:nvSpPr>
+        <p:spPr>
+          <a:xfrm>
+            <a:off x="381300" y="685800"/>
+            <a:ext cx="6096000" cy="3429000"/>
+          </a:xfrm>
+          <a:custGeom>
+            <a:pathLst>
+              <a:path extrusionOk="0" h="120000" w="120000">
+                <a:moveTo>
+                  <a:pt x="0" y="0"/>
+                </a:moveTo>
+                <a:lnTo>
+                  <a:pt x="120000" y="0"/>
+                </a:lnTo>
+                <a:lnTo>
+                  <a:pt x="120000" y="120000"/>
+                </a:lnTo>
+                <a:lnTo>
+                  <a:pt x="0" y="120000"/>
+                </a:lnTo>
+                <a:close/>
+              </a:path>
+            </a:pathLst>
+          </a:custGeom>
+        </p:spPr>
+      </p:sp>
+      <p:sp>
+        <p:nvSpPr>
+          <p:cNvPr id="96" name="Shape 96"/>
+          <p:cNvSpPr txBox="1"/>
+          <p:nvPr>
+            <p:ph idx="1" type="body"/>
+          </p:nvPr>
+        </p:nvSpPr>
+        <p:spPr>
+          <a:xfrm>
+            <a:off x="685800" y="4343400"/>
+            <a:ext cx="5486400" cy="4114800"/>
+          </a:xfrm>
+          <a:prstGeom prst="rect">
+            <a:avLst/>
+          </a:prstGeom>
+        </p:spPr>
+        <p:txBody>
+          <a:bodyPr anchorCtr="0" anchor="t" bIns="91425" lIns="91425" rIns="91425" wrap="square" tIns="91425">
+            <a:noAutofit/>
+          </a:bodyPr>
+          <a:lstStyle/>
+          <a:p>
+            <a:pPr lvl="0">
+              <a:spcBef>
+                <a:spcPts val="0"/>
+              </a:spcBef>
+              <a:buNone/>
+            </a:pPr>
+            <a:r>
+              <a:t/>
+            </a:r>
+            <a:endParaRPr/>
+          </a:p>
+        </p:txBody>
+      </p:sp>
+    </p:spTree>
+  </p:cSld>
+  <p:clrMapOvr>
+    <a:masterClrMapping/>
+  </p:clrMapOvr>
+</p:notes>
+</file>
+
+<file path=ppt/notesSlides/notesSlide9.xml><?xml version="1.0" encoding="utf-8"?>
+<p:notes xmlns:a="http://schemas.openxmlformats.org/drawingml/2006/main" xmlns:r="http://schemas.openxmlformats.org/officeDocument/2006/relationships" xmlns:mc="http://schemas.openxmlformats.org/markup-compatibility/2006" xmlns:mv="urn:schemas-microsoft-com:mac:vml" xmlns:p="http://schemas.openxmlformats.org/presentationml/2006/main" xmlns:c="http://schemas.openxmlformats.org/drawingml/2006/chart" xmlns:dgm="http://schemas.openxmlformats.org/drawingml/2006/diagram" xmlns:o="urn:schemas-microsoft-com:office:office" xmlns:v="urn:schemas-microsoft-com:vml" xmlns:pvml="urn:schemas-microsoft-com:office:powerpoint" xmlns:com="http://schemas.openxmlformats.org/drawingml/2006/compatibility" xmlns:p14="http://schemas.microsoft.com/office/powerpoint/2010/main" xmlns:p15="http://schemas.microsoft.com/office/powerpoint/2012/main" showMasterPhAnim="0" showMasterSp="0">
+  <p:cSld>
+    <p:spTree>
+      <p:nvGrpSpPr>
+        <p:cNvPr id="100" name="Shape 100"/>
+        <p:cNvGrpSpPr/>
+        <p:nvPr/>
+      </p:nvGrpSpPr>
+      <p:grpSpPr>
+        <a:xfrm>
+          <a:off x="0" y="0"/>
+          <a:ext cx="0" cy="0"/>
+          <a:chOff x="0" y="0"/>
+          <a:chExt cx="0" cy="0"/>
+        </a:xfrm>
+      </p:grpSpPr>
+      <p:sp>
+        <p:nvSpPr>
+          <p:cNvPr id="101" name="Shape 101"/>
+          <p:cNvSpPr/>
+          <p:nvPr>
+            <p:ph idx="2" type="sldImg"/>
+          </p:nvPr>
+        </p:nvSpPr>
+        <p:spPr>
+          <a:xfrm>
+            <a:off x="381300" y="685800"/>
+            <a:ext cx="6096000" cy="3429000"/>
+          </a:xfrm>
+          <a:custGeom>
+            <a:pathLst>
+              <a:path extrusionOk="0" h="120000" w="120000">
+                <a:moveTo>
+                  <a:pt x="0" y="0"/>
+                </a:moveTo>
+                <a:lnTo>
+                  <a:pt x="120000" y="0"/>
+                </a:lnTo>
+                <a:lnTo>
+                  <a:pt x="120000" y="120000"/>
+                </a:lnTo>
+                <a:lnTo>
+                  <a:pt x="0" y="120000"/>
+                </a:lnTo>
+                <a:close/>
+              </a:path>
+            </a:pathLst>
+          </a:custGeom>
+        </p:spPr>
+      </p:sp>
+      <p:sp>
+        <p:nvSpPr>
+          <p:cNvPr id="102" name="Shape 102"/>
           <p:cNvSpPr txBox="1"/>
           <p:nvPr>
             <p:ph idx="1" type="body"/>
@@ -4181,9 +4853,379 @@
           <a:chExt cx="0" cy="0"/>
         </a:xfrm>
       </p:grpSpPr>
+      <p:sp>
+        <p:nvSpPr>
+          <p:cNvPr id="54" name="Shape 54"/>
+          <p:cNvSpPr txBox="1"/>
+          <p:nvPr>
+            <p:ph type="title"/>
+          </p:nvPr>
+        </p:nvSpPr>
+        <p:spPr>
+          <a:xfrm>
+            <a:off x="311700" y="445025"/>
+            <a:ext cx="8520600" cy="572700"/>
+          </a:xfrm>
+          <a:prstGeom prst="rect">
+            <a:avLst/>
+          </a:prstGeom>
+        </p:spPr>
+        <p:txBody>
+          <a:bodyPr anchorCtr="0" anchor="t" bIns="91425" lIns="91425" rIns="91425" wrap="square" tIns="91425">
+            <a:noAutofit/>
+          </a:bodyPr>
+          <a:lstStyle/>
+          <a:p>
+            <a:pPr lvl="0" algn="ctr">
+              <a:spcBef>
+                <a:spcPts val="0"/>
+              </a:spcBef>
+              <a:buNone/>
+            </a:pPr>
+            <a:r>
+              <a:rPr lang="en-GB"/>
+              <a:t>Objetivos</a:t>
+            </a:r>
+          </a:p>
+        </p:txBody>
+      </p:sp>
+      <p:sp>
+        <p:nvSpPr>
+          <p:cNvPr id="55" name="Shape 55"/>
+          <p:cNvSpPr txBox="1"/>
+          <p:nvPr>
+            <p:ph idx="1" type="body"/>
+          </p:nvPr>
+        </p:nvSpPr>
+        <p:spPr>
+          <a:xfrm>
+            <a:off x="311700" y="1152475"/>
+            <a:ext cx="8520600" cy="3416400"/>
+          </a:xfrm>
+          <a:prstGeom prst="rect">
+            <a:avLst/>
+          </a:prstGeom>
+        </p:spPr>
+        <p:txBody>
+          <a:bodyPr anchorCtr="0" anchor="t" bIns="91425" lIns="91425" rIns="91425" wrap="square" tIns="91425">
+            <a:noAutofit/>
+          </a:bodyPr>
+          <a:lstStyle/>
+          <a:p>
+            <a:pPr indent="-342900" lvl="0" marL="457200" rtl="0">
+              <a:spcBef>
+                <a:spcPts val="0"/>
+              </a:spcBef>
+              <a:spcAft>
+                <a:spcPts val="0"/>
+              </a:spcAft>
+              <a:buSzPts val="1800"/>
+              <a:buChar char="●"/>
+            </a:pPr>
+            <a:r>
+              <a:rPr lang="en-GB"/>
+              <a:t>Estudiar el comportamiento del algoritmo de criba en rango variando el rango que procesa cada consumer</a:t>
+            </a:r>
+          </a:p>
+          <a:p>
+            <a:pPr indent="-342900" lvl="0" marL="457200" rtl="0">
+              <a:spcBef>
+                <a:spcPts val="0"/>
+              </a:spcBef>
+              <a:spcAft>
+                <a:spcPts val="0"/>
+              </a:spcAft>
+              <a:buSzPts val="1800"/>
+              <a:buChar char="●"/>
+            </a:pPr>
+            <a:r>
+              <a:rPr lang="en-GB"/>
+              <a:t>Implementar una solución cnc que aplique el test probabilístico rabin miller para cada número en paralelo (para el rango que usamos, es determinístico)</a:t>
+            </a:r>
+          </a:p>
+          <a:p>
+            <a:pPr indent="-342900" lvl="0" marL="457200">
+              <a:spcBef>
+                <a:spcPts val="0"/>
+              </a:spcBef>
+              <a:buSzPts val="1800"/>
+              <a:buChar char="●"/>
+            </a:pPr>
+            <a:r>
+              <a:rPr lang="en-GB"/>
+              <a:t>Comparar esta nueva solución con la que nos había dado mejores resultados: la criba en rango</a:t>
+            </a:r>
+          </a:p>
+        </p:txBody>
+      </p:sp>
+    </p:spTree>
+  </p:cSld>
+  <p:clrMapOvr>
+    <a:masterClrMapping/>
+  </p:clrMapOvr>
+</p:sld>
+</file>
+
+<file path=ppt/slides/slide10.xml><?xml version="1.0" encoding="utf-8"?>
+<p:sld xmlns:a="http://schemas.openxmlformats.org/drawingml/2006/main" xmlns:r="http://schemas.openxmlformats.org/officeDocument/2006/relationships" xmlns:mc="http://schemas.openxmlformats.org/markup-compatibility/2006" xmlns:mv="urn:schemas-microsoft-com:mac:vml" xmlns:p="http://schemas.openxmlformats.org/presentationml/2006/main" xmlns:c="http://schemas.openxmlformats.org/drawingml/2006/chart" xmlns:dgm="http://schemas.openxmlformats.org/drawingml/2006/diagram" xmlns:o="urn:schemas-microsoft-com:office:office" xmlns:v="urn:schemas-microsoft-com:vml" xmlns:pvml="urn:schemas-microsoft-com:office:powerpoint" xmlns:com="http://schemas.openxmlformats.org/drawingml/2006/compatibility" xmlns:p14="http://schemas.microsoft.com/office/powerpoint/2010/main" xmlns:p15="http://schemas.microsoft.com/office/powerpoint/2012/main">
+  <p:cSld>
+    <p:spTree>
+      <p:nvGrpSpPr>
+        <p:cNvPr id="108" name="Shape 108"/>
+        <p:cNvGrpSpPr/>
+        <p:nvPr/>
+      </p:nvGrpSpPr>
+      <p:grpSpPr>
+        <a:xfrm>
+          <a:off x="0" y="0"/>
+          <a:ext cx="0" cy="0"/>
+          <a:chOff x="0" y="0"/>
+          <a:chExt cx="0" cy="0"/>
+        </a:xfrm>
+      </p:grpSpPr>
+      <p:sp>
+        <p:nvSpPr>
+          <p:cNvPr id="109" name="Shape 109"/>
+          <p:cNvSpPr txBox="1"/>
+          <p:nvPr>
+            <p:ph type="title"/>
+          </p:nvPr>
+        </p:nvSpPr>
+        <p:spPr>
+          <a:xfrm>
+            <a:off x="311700" y="445025"/>
+            <a:ext cx="8520600" cy="572700"/>
+          </a:xfrm>
+          <a:prstGeom prst="rect">
+            <a:avLst/>
+          </a:prstGeom>
+        </p:spPr>
+        <p:txBody>
+          <a:bodyPr anchorCtr="0" anchor="t" bIns="91425" lIns="91425" rIns="91425" wrap="square" tIns="91425">
+            <a:noAutofit/>
+          </a:bodyPr>
+          <a:lstStyle/>
+          <a:p>
+            <a:pPr lvl="0" algn="ctr">
+              <a:spcBef>
+                <a:spcPts val="0"/>
+              </a:spcBef>
+              <a:buNone/>
+            </a:pPr>
+            <a:r>
+              <a:rPr lang="en-GB"/>
+              <a:t>Análisis</a:t>
+            </a:r>
+          </a:p>
+        </p:txBody>
+      </p:sp>
+      <p:sp>
+        <p:nvSpPr>
+          <p:cNvPr id="110" name="Shape 110"/>
+          <p:cNvSpPr txBox="1"/>
+          <p:nvPr>
+            <p:ph idx="1" type="body"/>
+          </p:nvPr>
+        </p:nvSpPr>
+        <p:spPr>
+          <a:xfrm>
+            <a:off x="311700" y="1152475"/>
+            <a:ext cx="8520600" cy="3416400"/>
+          </a:xfrm>
+          <a:prstGeom prst="rect">
+            <a:avLst/>
+          </a:prstGeom>
+        </p:spPr>
+        <p:txBody>
+          <a:bodyPr anchorCtr="0" anchor="t" bIns="91425" lIns="91425" rIns="91425" wrap="square" tIns="91425">
+            <a:noAutofit/>
+          </a:bodyPr>
+          <a:lstStyle/>
+          <a:p>
+            <a:pPr indent="-342900" lvl="0" marL="457200" rtl="0">
+              <a:spcBef>
+                <a:spcPts val="0"/>
+              </a:spcBef>
+              <a:spcAft>
+                <a:spcPts val="0"/>
+              </a:spcAft>
+              <a:buSzPts val="1800"/>
+              <a:buChar char="●"/>
+            </a:pPr>
+            <a:r>
+              <a:rPr lang="en-GB"/>
+              <a:t>Al trabajar con números cada vez mayores, como habíamos dicho la criba va perdiendo contra el rabin miller que teníamos anteriormente</a:t>
+            </a:r>
+          </a:p>
+          <a:p>
+            <a:pPr indent="-342900" lvl="0" marL="457200" rtl="0">
+              <a:spcBef>
+                <a:spcPts val="0"/>
+              </a:spcBef>
+              <a:spcAft>
+                <a:spcPts val="0"/>
+              </a:spcAft>
+              <a:buSzPts val="1800"/>
+              <a:buChar char="●"/>
+            </a:pPr>
+            <a:r>
+              <a:rPr lang="en-GB"/>
+              <a:t>El nuevo algoritmo que combina ambas ideas mejora notablemente la performance, en el último caso la combinación de ambos tardó 36 segundos versus los 100 segundos de sólo usando rabin miller y los 180 de sólo criba</a:t>
+            </a:r>
+          </a:p>
+          <a:p>
+            <a:pPr indent="-342900" lvl="0" marL="457200">
+              <a:spcBef>
+                <a:spcPts val="0"/>
+              </a:spcBef>
+              <a:buSzPts val="1800"/>
+              <a:buChar char="●"/>
+            </a:pPr>
+            <a:r>
+              <a:rPr lang="en-GB"/>
+              <a:t>Hemos logrado un buen balance entre ambas ideas, superando el mejor algoritmo que teníamos anteriormente</a:t>
+            </a:r>
+          </a:p>
+        </p:txBody>
+      </p:sp>
+    </p:spTree>
+  </p:cSld>
+  <p:clrMapOvr>
+    <a:masterClrMapping/>
+  </p:clrMapOvr>
+</p:sld>
+</file>
+
+<file path=ppt/slides/slide11.xml><?xml version="1.0" encoding="utf-8"?>
+<p:sld xmlns:a="http://schemas.openxmlformats.org/drawingml/2006/main" xmlns:r="http://schemas.openxmlformats.org/officeDocument/2006/relationships" xmlns:mc="http://schemas.openxmlformats.org/markup-compatibility/2006" xmlns:mv="urn:schemas-microsoft-com:mac:vml" xmlns:p="http://schemas.openxmlformats.org/presentationml/2006/main" xmlns:c="http://schemas.openxmlformats.org/drawingml/2006/chart" xmlns:dgm="http://schemas.openxmlformats.org/drawingml/2006/diagram" xmlns:o="urn:schemas-microsoft-com:office:office" xmlns:v="urn:schemas-microsoft-com:vml" xmlns:pvml="urn:schemas-microsoft-com:office:powerpoint" xmlns:com="http://schemas.openxmlformats.org/drawingml/2006/compatibility" xmlns:p14="http://schemas.microsoft.com/office/powerpoint/2010/main" xmlns:p15="http://schemas.microsoft.com/office/powerpoint/2012/main">
+  <p:cSld>
+    <p:spTree>
+      <p:nvGrpSpPr>
+        <p:cNvPr id="114" name="Shape 114"/>
+        <p:cNvGrpSpPr/>
+        <p:nvPr/>
+      </p:nvGrpSpPr>
+      <p:grpSpPr>
+        <a:xfrm>
+          <a:off x="0" y="0"/>
+          <a:ext cx="0" cy="0"/>
+          <a:chOff x="0" y="0"/>
+          <a:chExt cx="0" cy="0"/>
+        </a:xfrm>
+      </p:grpSpPr>
+      <p:sp>
+        <p:nvSpPr>
+          <p:cNvPr id="115" name="Shape 115"/>
+          <p:cNvSpPr txBox="1"/>
+          <p:nvPr>
+            <p:ph type="title"/>
+          </p:nvPr>
+        </p:nvSpPr>
+        <p:spPr>
+          <a:xfrm>
+            <a:off x="311700" y="445025"/>
+            <a:ext cx="8520600" cy="572700"/>
+          </a:xfrm>
+          <a:prstGeom prst="rect">
+            <a:avLst/>
+          </a:prstGeom>
+        </p:spPr>
+        <p:txBody>
+          <a:bodyPr anchorCtr="0" anchor="t" bIns="91425" lIns="91425" rIns="91425" wrap="square" tIns="91425">
+            <a:noAutofit/>
+          </a:bodyPr>
+          <a:lstStyle/>
+          <a:p>
+            <a:pPr lvl="0" algn="ctr">
+              <a:spcBef>
+                <a:spcPts val="0"/>
+              </a:spcBef>
+              <a:buNone/>
+            </a:pPr>
+            <a:r>
+              <a:rPr lang="en-GB"/>
+              <a:t>A futuro</a:t>
+            </a:r>
+          </a:p>
+        </p:txBody>
+      </p:sp>
+      <p:sp>
+        <p:nvSpPr>
+          <p:cNvPr id="116" name="Shape 116"/>
+          <p:cNvSpPr txBox="1"/>
+          <p:nvPr>
+            <p:ph idx="1" type="body"/>
+          </p:nvPr>
+        </p:nvSpPr>
+        <p:spPr>
+          <a:xfrm>
+            <a:off x="311700" y="1152475"/>
+            <a:ext cx="8520600" cy="3416400"/>
+          </a:xfrm>
+          <a:prstGeom prst="rect">
+            <a:avLst/>
+          </a:prstGeom>
+        </p:spPr>
+        <p:txBody>
+          <a:bodyPr anchorCtr="0" anchor="t" bIns="91425" lIns="91425" rIns="91425" wrap="square" tIns="91425">
+            <a:noAutofit/>
+          </a:bodyPr>
+          <a:lstStyle/>
+          <a:p>
+            <a:pPr indent="-342900" lvl="0" marL="457200" rtl="0">
+              <a:spcBef>
+                <a:spcPts val="0"/>
+              </a:spcBef>
+              <a:buSzPts val="1800"/>
+              <a:buChar char="●"/>
+            </a:pPr>
+            <a:r>
+              <a:rPr lang="en-GB"/>
+              <a:t>Implementar los algoritmos con pcr en lugar de cnc puro y estudiar su performance en una máquina con 16 cores</a:t>
+            </a:r>
+          </a:p>
+          <a:p>
+            <a:pPr lvl="0">
+              <a:spcBef>
+                <a:spcPts val="0"/>
+              </a:spcBef>
+              <a:buNone/>
+            </a:pPr>
+            <a:r>
+              <a:t/>
+            </a:r>
+            <a:endParaRPr/>
+          </a:p>
+        </p:txBody>
+      </p:sp>
+    </p:spTree>
+  </p:cSld>
+  <p:clrMapOvr>
+    <a:masterClrMapping/>
+  </p:clrMapOvr>
+</p:sld>
+</file>
+
+<file path=ppt/slides/slide2.xml><?xml version="1.0" encoding="utf-8"?>
+<p:sld xmlns:a="http://schemas.openxmlformats.org/drawingml/2006/main" xmlns:r="http://schemas.openxmlformats.org/officeDocument/2006/relationships" xmlns:mc="http://schemas.openxmlformats.org/markup-compatibility/2006" xmlns:mv="urn:schemas-microsoft-com:mac:vml" xmlns:p="http://schemas.openxmlformats.org/presentationml/2006/main" xmlns:c="http://schemas.openxmlformats.org/drawingml/2006/chart" xmlns:dgm="http://schemas.openxmlformats.org/drawingml/2006/diagram" xmlns:o="urn:schemas-microsoft-com:office:office" xmlns:v="urn:schemas-microsoft-com:vml" xmlns:pvml="urn:schemas-microsoft-com:office:powerpoint" xmlns:com="http://schemas.openxmlformats.org/drawingml/2006/compatibility" xmlns:p14="http://schemas.microsoft.com/office/powerpoint/2010/main" xmlns:p15="http://schemas.microsoft.com/office/powerpoint/2012/main">
+  <p:cSld>
+    <p:spTree>
+      <p:nvGrpSpPr>
+        <p:cNvPr id="59" name="Shape 59"/>
+        <p:cNvGrpSpPr/>
+        <p:nvPr/>
+      </p:nvGrpSpPr>
+      <p:grpSpPr>
+        <a:xfrm>
+          <a:off x="0" y="0"/>
+          <a:ext cx="0" cy="0"/>
+          <a:chOff x="0" y="0"/>
+          <a:chExt cx="0" cy="0"/>
+        </a:xfrm>
+      </p:grpSpPr>
       <p:graphicFrame>
         <p:nvGraphicFramePr>
-          <p:cNvPr id="54" name="Shape 54"/>
+          <p:cNvPr id="60" name="Shape 60"/>
           <p:cNvGraphicFramePr/>
           <p:nvPr/>
         </p:nvGraphicFramePr>
@@ -4196,7 +5238,7 @@
             <a:tbl>
               <a:tblPr>
                 <a:noFill/>
-                <a:tableStyleId>{D5554BBA-F126-402F-B9B9-4082A916DF2F}</a:tableStyleId>
+                <a:tableStyleId>{7CA0198F-87B8-4B78-898B-B92666C4AB4E}</a:tableStyleId>
               </a:tblPr>
               <a:tblGrid>
                 <a:gridCol w="865325"/>
@@ -5182,7 +6224,7 @@
       </p:graphicFrame>
       <p:sp>
         <p:nvSpPr>
-          <p:cNvPr id="55" name="Shape 55"/>
+          <p:cNvPr id="61" name="Shape 61"/>
           <p:cNvSpPr txBox="1"/>
           <p:nvPr/>
         </p:nvSpPr>
@@ -5213,7 +6255,7 @@
             </a:pPr>
             <a:r>
               <a:rPr b="1" lang="en-GB" sz="3600"/>
-              <a:t>Algoritmo paralelo cnc</a:t>
+              <a:t>Variando el rango</a:t>
             </a:r>
           </a:p>
           <a:p>
@@ -5238,12 +6280,12 @@
 </p:sld>
 </file>
 
-<file path=ppt/slides/slide2.xml><?xml version="1.0" encoding="utf-8"?>
+<file path=ppt/slides/slide3.xml><?xml version="1.0" encoding="utf-8"?>
 <p:sld xmlns:a="http://schemas.openxmlformats.org/drawingml/2006/main" xmlns:r="http://schemas.openxmlformats.org/officeDocument/2006/relationships" xmlns:mc="http://schemas.openxmlformats.org/markup-compatibility/2006" xmlns:mv="urn:schemas-microsoft-com:mac:vml" xmlns:p="http://schemas.openxmlformats.org/presentationml/2006/main" xmlns:c="http://schemas.openxmlformats.org/drawingml/2006/chart" xmlns:dgm="http://schemas.openxmlformats.org/drawingml/2006/diagram" xmlns:o="urn:schemas-microsoft-com:office:office" xmlns:v="urn:schemas-microsoft-com:vml" xmlns:pvml="urn:schemas-microsoft-com:office:powerpoint" xmlns:com="http://schemas.openxmlformats.org/drawingml/2006/compatibility" xmlns:p14="http://schemas.microsoft.com/office/powerpoint/2010/main" xmlns:p15="http://schemas.microsoft.com/office/powerpoint/2012/main">
   <p:cSld>
     <p:spTree>
       <p:nvGrpSpPr>
-        <p:cNvPr id="59" name="Shape 59"/>
+        <p:cNvPr id="65" name="Shape 65"/>
         <p:cNvGrpSpPr/>
         <p:nvPr/>
       </p:nvGrpSpPr>
@@ -5257,52 +6299,16 @@
       </p:grpSpPr>
       <p:sp>
         <p:nvSpPr>
-          <p:cNvPr id="60" name="Shape 60"/>
+          <p:cNvPr id="66" name="Shape 66"/>
           <p:cNvSpPr txBox="1"/>
           <p:nvPr>
-            <p:ph type="ctrTitle"/>
+            <p:ph type="title"/>
           </p:nvPr>
         </p:nvSpPr>
         <p:spPr>
           <a:xfrm>
-            <a:off x="311708" y="744575"/>
-            <a:ext cx="8520600" cy="2052600"/>
-          </a:xfrm>
-          <a:prstGeom prst="rect">
-            <a:avLst/>
-          </a:prstGeom>
-        </p:spPr>
-        <p:txBody>
-          <a:bodyPr anchorCtr="0" anchor="b" bIns="91425" lIns="91425" rIns="91425" wrap="square" tIns="91425">
-            <a:noAutofit/>
-          </a:bodyPr>
-          <a:lstStyle/>
-          <a:p>
-            <a:pPr lvl="0">
-              <a:spcBef>
-                <a:spcPts val="0"/>
-              </a:spcBef>
-              <a:buNone/>
-            </a:pPr>
-            <a:r>
-              <a:t/>
-            </a:r>
-            <a:endParaRPr/>
-          </a:p>
-        </p:txBody>
-      </p:sp>
-      <p:sp>
-        <p:nvSpPr>
-          <p:cNvPr id="61" name="Shape 61"/>
-          <p:cNvSpPr txBox="1"/>
-          <p:nvPr>
-            <p:ph idx="1" type="subTitle"/>
-          </p:nvPr>
-        </p:nvSpPr>
-        <p:spPr>
-          <a:xfrm>
-            <a:off x="311700" y="2834125"/>
-            <a:ext cx="8520600" cy="792600"/>
+            <a:off x="311700" y="445025"/>
+            <a:ext cx="8520600" cy="572700"/>
           </a:xfrm>
           <a:prstGeom prst="rect">
             <a:avLst/>
@@ -5314,47 +6320,88 @@
           </a:bodyPr>
           <a:lstStyle/>
           <a:p>
-            <a:pPr lvl="0">
+            <a:pPr lvl="0" algn="ctr">
               <a:spcBef>
                 <a:spcPts val="0"/>
               </a:spcBef>
               <a:buNone/>
             </a:pPr>
             <a:r>
-              <a:t/>
+              <a:rPr lang="en-GB"/>
+              <a:t>Conclusiones</a:t>
             </a:r>
-            <a:endParaRPr/>
           </a:p>
         </p:txBody>
       </p:sp>
-      <p:pic>
-        <p:nvPicPr>
-          <p:cNvPr id="62" name="Shape 62"/>
-          <p:cNvPicPr preferRelativeResize="0"/>
-          <p:nvPr/>
-        </p:nvPicPr>
-        <p:blipFill>
-          <a:blip r:embed="rId3">
-            <a:alphaModFix/>
-          </a:blip>
-          <a:stretch>
-            <a:fillRect/>
-          </a:stretch>
-        </p:blipFill>
-        <p:spPr>
-          <a:xfrm>
-            <a:off x="0" y="0"/>
-            <a:ext cx="9143999" cy="5143501"/>
+      <p:sp>
+        <p:nvSpPr>
+          <p:cNvPr id="67" name="Shape 67"/>
+          <p:cNvSpPr txBox="1"/>
+          <p:nvPr>
+            <p:ph idx="1" type="body"/>
+          </p:nvPr>
+        </p:nvSpPr>
+        <p:spPr>
+          <a:xfrm>
+            <a:off x="311700" y="1152475"/>
+            <a:ext cx="8520600" cy="3416400"/>
           </a:xfrm>
           <a:prstGeom prst="rect">
             <a:avLst/>
           </a:prstGeom>
-          <a:noFill/>
-          <a:ln>
-            <a:noFill/>
-          </a:ln>
-        </p:spPr>
-      </p:pic>
+        </p:spPr>
+        <p:txBody>
+          <a:bodyPr anchorCtr="0" anchor="t" bIns="91425" lIns="91425" rIns="91425" wrap="square" tIns="91425">
+            <a:noAutofit/>
+          </a:bodyPr>
+          <a:lstStyle/>
+          <a:p>
+            <a:pPr indent="-342900" lvl="0" marL="457200" rtl="0">
+              <a:spcBef>
+                <a:spcPts val="0"/>
+              </a:spcBef>
+              <a:spcAft>
+                <a:spcPts val="0"/>
+              </a:spcAft>
+              <a:buSzPts val="1800"/>
+              <a:buChar char="●"/>
+            </a:pPr>
+            <a:r>
+              <a:rPr lang="en-GB"/>
+              <a:t>Puede observarse que la performance varía de acuerdo al rango procesado en cada caso, con un comportamiento que va mejorando al aumentar el rango hasta llegar a cierto punto, a partir del cual va empeorando ya que se acerca a perder el paralelismo que había</a:t>
+            </a:r>
+          </a:p>
+          <a:p>
+            <a:pPr indent="-342900" lvl="0" marL="457200" rtl="0">
+              <a:spcBef>
+                <a:spcPts val="0"/>
+              </a:spcBef>
+              <a:spcAft>
+                <a:spcPts val="0"/>
+              </a:spcAft>
+              <a:buSzPts val="1800"/>
+              <a:buChar char="●"/>
+            </a:pPr>
+            <a:r>
+              <a:rPr lang="en-GB"/>
+              <a:t>En el primer caso el mejor rango fue el que generó 10000 procesos para los consumers, mientras que en el segundo caso fue el que generó 400 procesos</a:t>
+            </a:r>
+          </a:p>
+          <a:p>
+            <a:pPr indent="-342900" lvl="0" marL="457200">
+              <a:spcBef>
+                <a:spcPts val="0"/>
+              </a:spcBef>
+              <a:buSzPts val="1800"/>
+              <a:buChar char="●"/>
+            </a:pPr>
+            <a:r>
+              <a:rPr lang="en-GB"/>
+              <a:t>Dependiendo del rango estudiado lo óptimo pareciera variar, elegimos el rango de a 10000 como parámetro por defecto dado que fue razonable en ambos casos</a:t>
+            </a:r>
+          </a:p>
+        </p:txBody>
+      </p:sp>
     </p:spTree>
   </p:cSld>
   <p:clrMapOvr>
@@ -5363,12 +6410,12 @@
 </p:sld>
 </file>
 
-<file path=ppt/slides/slide3.xml><?xml version="1.0" encoding="utf-8"?>
+<file path=ppt/slides/slide4.xml><?xml version="1.0" encoding="utf-8"?>
 <p:sld xmlns:a="http://schemas.openxmlformats.org/drawingml/2006/main" xmlns:r="http://schemas.openxmlformats.org/officeDocument/2006/relationships" xmlns:mc="http://schemas.openxmlformats.org/markup-compatibility/2006" xmlns:mv="urn:schemas-microsoft-com:mac:vml" xmlns:p="http://schemas.openxmlformats.org/presentationml/2006/main" xmlns:c="http://schemas.openxmlformats.org/drawingml/2006/chart" xmlns:dgm="http://schemas.openxmlformats.org/drawingml/2006/diagram" xmlns:o="urn:schemas-microsoft-com:office:office" xmlns:v="urn:schemas-microsoft-com:vml" xmlns:pvml="urn:schemas-microsoft-com:office:powerpoint" xmlns:com="http://schemas.openxmlformats.org/drawingml/2006/compatibility" xmlns:p14="http://schemas.microsoft.com/office/powerpoint/2010/main" xmlns:p15="http://schemas.microsoft.com/office/powerpoint/2012/main">
   <p:cSld>
     <p:spTree>
       <p:nvGrpSpPr>
-        <p:cNvPr id="66" name="Shape 66"/>
+        <p:cNvPr id="71" name="Shape 71"/>
         <p:cNvGrpSpPr/>
         <p:nvPr/>
       </p:nvGrpSpPr>
@@ -5382,23 +6429,23 @@
       </p:grpSpPr>
       <p:sp>
         <p:nvSpPr>
-          <p:cNvPr id="67" name="Shape 67"/>
+          <p:cNvPr id="72" name="Shape 72"/>
           <p:cNvSpPr txBox="1"/>
           <p:nvPr>
-            <p:ph type="title"/>
+            <p:ph type="ctrTitle"/>
           </p:nvPr>
         </p:nvSpPr>
         <p:spPr>
           <a:xfrm>
-            <a:off x="311700" y="445025"/>
-            <a:ext cx="8520600" cy="572700"/>
+            <a:off x="311708" y="744575"/>
+            <a:ext cx="8520600" cy="2052600"/>
           </a:xfrm>
           <a:prstGeom prst="rect">
             <a:avLst/>
           </a:prstGeom>
         </p:spPr>
         <p:txBody>
-          <a:bodyPr anchorCtr="0" anchor="t" bIns="91425" lIns="91425" rIns="91425" wrap="square" tIns="91425">
+          <a:bodyPr anchorCtr="0" anchor="b" bIns="91425" lIns="91425" rIns="91425" wrap="square" tIns="91425">
             <a:noAutofit/>
           </a:bodyPr>
           <a:lstStyle/>
@@ -5418,16 +6465,16 @@
       </p:sp>
       <p:sp>
         <p:nvSpPr>
-          <p:cNvPr id="68" name="Shape 68"/>
+          <p:cNvPr id="73" name="Shape 73"/>
           <p:cNvSpPr txBox="1"/>
           <p:nvPr>
-            <p:ph idx="1" type="body"/>
+            <p:ph idx="1" type="subTitle"/>
           </p:nvPr>
         </p:nvSpPr>
         <p:spPr>
           <a:xfrm>
-            <a:off x="311700" y="1152475"/>
-            <a:ext cx="8520600" cy="3416400"/>
+            <a:off x="311700" y="2834125"/>
+            <a:ext cx="8520600" cy="792600"/>
           </a:xfrm>
           <a:prstGeom prst="rect">
             <a:avLst/>
@@ -5454,7 +6501,7 @@
       </p:sp>
       <p:pic>
         <p:nvPicPr>
-          <p:cNvPr id="69" name="Shape 69"/>
+          <p:cNvPr id="74" name="Shape 74"/>
           <p:cNvPicPr preferRelativeResize="0"/>
           <p:nvPr/>
         </p:nvPicPr>
@@ -5469,7 +6516,7 @@
         <p:spPr>
           <a:xfrm>
             <a:off x="0" y="0"/>
-            <a:ext cx="9192849" cy="5143499"/>
+            <a:ext cx="9143999" cy="5143501"/>
           </a:xfrm>
           <a:prstGeom prst="rect">
             <a:avLst/>
@@ -5488,12 +6535,555 @@
 </p:sld>
 </file>
 
-<file path=ppt/slides/slide4.xml><?xml version="1.0" encoding="utf-8"?>
+<file path=ppt/slides/slide5.xml><?xml version="1.0" encoding="utf-8"?>
 <p:sld xmlns:a="http://schemas.openxmlformats.org/drawingml/2006/main" xmlns:r="http://schemas.openxmlformats.org/officeDocument/2006/relationships" xmlns:mc="http://schemas.openxmlformats.org/markup-compatibility/2006" xmlns:mv="urn:schemas-microsoft-com:mac:vml" xmlns:p="http://schemas.openxmlformats.org/presentationml/2006/main" xmlns:c="http://schemas.openxmlformats.org/drawingml/2006/chart" xmlns:dgm="http://schemas.openxmlformats.org/drawingml/2006/diagram" xmlns:o="urn:schemas-microsoft-com:office:office" xmlns:v="urn:schemas-microsoft-com:vml" xmlns:pvml="urn:schemas-microsoft-com:office:powerpoint" xmlns:com="http://schemas.openxmlformats.org/drawingml/2006/compatibility" xmlns:p14="http://schemas.microsoft.com/office/powerpoint/2010/main" xmlns:p15="http://schemas.microsoft.com/office/powerpoint/2012/main">
   <p:cSld>
     <p:spTree>
       <p:nvGrpSpPr>
-        <p:cNvPr id="73" name="Shape 73"/>
+        <p:cNvPr id="78" name="Shape 78"/>
+        <p:cNvGrpSpPr/>
+        <p:nvPr/>
+      </p:nvGrpSpPr>
+      <p:grpSpPr>
+        <a:xfrm>
+          <a:off x="0" y="0"/>
+          <a:ext cx="0" cy="0"/>
+          <a:chOff x="0" y="0"/>
+          <a:chExt cx="0" cy="0"/>
+        </a:xfrm>
+      </p:grpSpPr>
+      <p:sp>
+        <p:nvSpPr>
+          <p:cNvPr id="79" name="Shape 79"/>
+          <p:cNvSpPr txBox="1"/>
+          <p:nvPr>
+            <p:ph type="title"/>
+          </p:nvPr>
+        </p:nvSpPr>
+        <p:spPr>
+          <a:xfrm>
+            <a:off x="311700" y="445025"/>
+            <a:ext cx="8520600" cy="572700"/>
+          </a:xfrm>
+          <a:prstGeom prst="rect">
+            <a:avLst/>
+          </a:prstGeom>
+        </p:spPr>
+        <p:txBody>
+          <a:bodyPr anchorCtr="0" anchor="t" bIns="91425" lIns="91425" rIns="91425" wrap="square" tIns="91425">
+            <a:noAutofit/>
+          </a:bodyPr>
+          <a:lstStyle/>
+          <a:p>
+            <a:pPr lvl="0" rtl="0" algn="ctr">
+              <a:spcBef>
+                <a:spcPts val="0"/>
+              </a:spcBef>
+              <a:buNone/>
+            </a:pPr>
+            <a:r>
+              <a:rPr lang="en-GB"/>
+              <a:t>Análisis</a:t>
+            </a:r>
+          </a:p>
+        </p:txBody>
+      </p:sp>
+      <p:sp>
+        <p:nvSpPr>
+          <p:cNvPr id="80" name="Shape 80"/>
+          <p:cNvSpPr txBox="1"/>
+          <p:nvPr>
+            <p:ph idx="1" type="body"/>
+          </p:nvPr>
+        </p:nvSpPr>
+        <p:spPr>
+          <a:xfrm>
+            <a:off x="311700" y="1152475"/>
+            <a:ext cx="8520600" cy="3416400"/>
+          </a:xfrm>
+          <a:prstGeom prst="rect">
+            <a:avLst/>
+          </a:prstGeom>
+        </p:spPr>
+        <p:txBody>
+          <a:bodyPr anchorCtr="0" anchor="t" bIns="91425" lIns="91425" rIns="91425" wrap="square" tIns="91425">
+            <a:noAutofit/>
+          </a:bodyPr>
+          <a:lstStyle/>
+          <a:p>
+            <a:pPr indent="-342900" lvl="0" marL="457200" rtl="0">
+              <a:spcBef>
+                <a:spcPts val="0"/>
+              </a:spcBef>
+              <a:spcAft>
+                <a:spcPts val="0"/>
+              </a:spcAft>
+              <a:buSzPts val="1800"/>
+              <a:buChar char="●"/>
+            </a:pPr>
+            <a:r>
+              <a:rPr lang="en-GB"/>
+              <a:t>Rabin miller es muy costoso, para números chicos es mejor la solución de ir hasta la </a:t>
+            </a:r>
+            <a:r>
+              <a:rPr lang="en-GB"/>
+              <a:t>raíz</a:t>
+            </a:r>
+            <a:r>
+              <a:rPr lang="en-GB"/>
+              <a:t> del número. Recordemos que la complejidad de rabin miller es O(k log^3 n). Incluso considerando el peor caso testeado de 100 millones, la raiz es 10000 mientras que con rabin miller realizamos al 18768 operaciones por cada testigo (usamos 9 testigos).</a:t>
+            </a:r>
+          </a:p>
+          <a:p>
+            <a:pPr indent="-342900" lvl="0" marL="457200" rtl="0">
+              <a:spcBef>
+                <a:spcPts val="0"/>
+              </a:spcBef>
+              <a:buSzPts val="1800"/>
+              <a:buChar char="●"/>
+            </a:pPr>
+            <a:r>
+              <a:rPr lang="en-GB"/>
+              <a:t>El número debe ser muy grande para que rabin miller sea mejor que ir hasta la raíz</a:t>
+            </a:r>
+          </a:p>
+          <a:p>
+            <a:pPr lvl="0" rtl="0">
+              <a:spcBef>
+                <a:spcPts val="0"/>
+              </a:spcBef>
+              <a:buNone/>
+            </a:pPr>
+            <a:r>
+              <a:t/>
+            </a:r>
+            <a:endParaRPr/>
+          </a:p>
+        </p:txBody>
+      </p:sp>
+    </p:spTree>
+  </p:cSld>
+  <p:clrMapOvr>
+    <a:masterClrMapping/>
+  </p:clrMapOvr>
+</p:sld>
+</file>
+
+<file path=ppt/slides/slide6.xml><?xml version="1.0" encoding="utf-8"?>
+<p:sld xmlns:a="http://schemas.openxmlformats.org/drawingml/2006/main" xmlns:r="http://schemas.openxmlformats.org/officeDocument/2006/relationships" xmlns:mc="http://schemas.openxmlformats.org/markup-compatibility/2006" xmlns:mv="urn:schemas-microsoft-com:mac:vml" xmlns:p="http://schemas.openxmlformats.org/presentationml/2006/main" xmlns:c="http://schemas.openxmlformats.org/drawingml/2006/chart" xmlns:dgm="http://schemas.openxmlformats.org/drawingml/2006/diagram" xmlns:o="urn:schemas-microsoft-com:office:office" xmlns:v="urn:schemas-microsoft-com:vml" xmlns:pvml="urn:schemas-microsoft-com:office:powerpoint" xmlns:com="http://schemas.openxmlformats.org/drawingml/2006/compatibility" xmlns:p14="http://schemas.microsoft.com/office/powerpoint/2010/main" xmlns:p15="http://schemas.microsoft.com/office/powerpoint/2012/main">
+  <p:cSld>
+    <p:spTree>
+      <p:nvGrpSpPr>
+        <p:cNvPr id="84" name="Shape 84"/>
+        <p:cNvGrpSpPr/>
+        <p:nvPr/>
+      </p:nvGrpSpPr>
+      <p:grpSpPr>
+        <a:xfrm>
+          <a:off x="0" y="0"/>
+          <a:ext cx="0" cy="0"/>
+          <a:chOff x="0" y="0"/>
+          <a:chExt cx="0" cy="0"/>
+        </a:xfrm>
+      </p:grpSpPr>
+      <p:sp>
+        <p:nvSpPr>
+          <p:cNvPr id="85" name="Shape 85"/>
+          <p:cNvSpPr txBox="1"/>
+          <p:nvPr>
+            <p:ph type="title"/>
+          </p:nvPr>
+        </p:nvSpPr>
+        <p:spPr>
+          <a:xfrm>
+            <a:off x="311700" y="445025"/>
+            <a:ext cx="8520600" cy="572700"/>
+          </a:xfrm>
+          <a:prstGeom prst="rect">
+            <a:avLst/>
+          </a:prstGeom>
+        </p:spPr>
+        <p:txBody>
+          <a:bodyPr anchorCtr="0" anchor="t" bIns="91425" lIns="91425" rIns="91425" wrap="square" tIns="91425">
+            <a:noAutofit/>
+          </a:bodyPr>
+          <a:lstStyle/>
+          <a:p>
+            <a:pPr lvl="0">
+              <a:spcBef>
+                <a:spcPts val="0"/>
+              </a:spcBef>
+              <a:buNone/>
+            </a:pPr>
+            <a:r>
+              <a:t/>
+            </a:r>
+            <a:endParaRPr/>
+          </a:p>
+        </p:txBody>
+      </p:sp>
+      <p:sp>
+        <p:nvSpPr>
+          <p:cNvPr id="86" name="Shape 86"/>
+          <p:cNvSpPr txBox="1"/>
+          <p:nvPr>
+            <p:ph idx="1" type="body"/>
+          </p:nvPr>
+        </p:nvSpPr>
+        <p:spPr>
+          <a:xfrm>
+            <a:off x="311700" y="1152475"/>
+            <a:ext cx="8520600" cy="3416400"/>
+          </a:xfrm>
+          <a:prstGeom prst="rect">
+            <a:avLst/>
+          </a:prstGeom>
+        </p:spPr>
+        <p:txBody>
+          <a:bodyPr anchorCtr="0" anchor="t" bIns="91425" lIns="91425" rIns="91425" wrap="square" tIns="91425">
+            <a:noAutofit/>
+          </a:bodyPr>
+          <a:lstStyle/>
+          <a:p>
+            <a:pPr lvl="0">
+              <a:spcBef>
+                <a:spcPts val="0"/>
+              </a:spcBef>
+              <a:buNone/>
+            </a:pPr>
+            <a:r>
+              <a:t/>
+            </a:r>
+            <a:endParaRPr/>
+          </a:p>
+        </p:txBody>
+      </p:sp>
+      <p:pic>
+        <p:nvPicPr>
+          <p:cNvPr id="87" name="Shape 87"/>
+          <p:cNvPicPr preferRelativeResize="0"/>
+          <p:nvPr/>
+        </p:nvPicPr>
+        <p:blipFill>
+          <a:blip r:embed="rId3">
+            <a:alphaModFix/>
+          </a:blip>
+          <a:stretch>
+            <a:fillRect/>
+          </a:stretch>
+        </p:blipFill>
+        <p:spPr>
+          <a:xfrm>
+            <a:off x="0" y="0"/>
+            <a:ext cx="9192849" cy="5143499"/>
+          </a:xfrm>
+          <a:prstGeom prst="rect">
+            <a:avLst/>
+          </a:prstGeom>
+          <a:noFill/>
+          <a:ln>
+            <a:noFill/>
+          </a:ln>
+        </p:spPr>
+      </p:pic>
+    </p:spTree>
+  </p:cSld>
+  <p:clrMapOvr>
+    <a:masterClrMapping/>
+  </p:clrMapOvr>
+</p:sld>
+</file>
+
+<file path=ppt/slides/slide7.xml><?xml version="1.0" encoding="utf-8"?>
+<p:sld xmlns:a="http://schemas.openxmlformats.org/drawingml/2006/main" xmlns:r="http://schemas.openxmlformats.org/officeDocument/2006/relationships" xmlns:mc="http://schemas.openxmlformats.org/markup-compatibility/2006" xmlns:mv="urn:schemas-microsoft-com:mac:vml" xmlns:p="http://schemas.openxmlformats.org/presentationml/2006/main" xmlns:c="http://schemas.openxmlformats.org/drawingml/2006/chart" xmlns:dgm="http://schemas.openxmlformats.org/drawingml/2006/diagram" xmlns:o="urn:schemas-microsoft-com:office:office" xmlns:v="urn:schemas-microsoft-com:vml" xmlns:pvml="urn:schemas-microsoft-com:office:powerpoint" xmlns:com="http://schemas.openxmlformats.org/drawingml/2006/compatibility" xmlns:p14="http://schemas.microsoft.com/office/powerpoint/2010/main" xmlns:p15="http://schemas.microsoft.com/office/powerpoint/2012/main">
+  <p:cSld>
+    <p:spTree>
+      <p:nvGrpSpPr>
+        <p:cNvPr id="91" name="Shape 91"/>
+        <p:cNvGrpSpPr/>
+        <p:nvPr/>
+      </p:nvGrpSpPr>
+      <p:grpSpPr>
+        <a:xfrm>
+          <a:off x="0" y="0"/>
+          <a:ext cx="0" cy="0"/>
+          <a:chOff x="0" y="0"/>
+          <a:chExt cx="0" cy="0"/>
+        </a:xfrm>
+      </p:grpSpPr>
+      <p:sp>
+        <p:nvSpPr>
+          <p:cNvPr id="92" name="Shape 92"/>
+          <p:cNvSpPr txBox="1"/>
+          <p:nvPr>
+            <p:ph type="title"/>
+          </p:nvPr>
+        </p:nvSpPr>
+        <p:spPr>
+          <a:xfrm>
+            <a:off x="311700" y="445025"/>
+            <a:ext cx="8520600" cy="572700"/>
+          </a:xfrm>
+          <a:prstGeom prst="rect">
+            <a:avLst/>
+          </a:prstGeom>
+        </p:spPr>
+        <p:txBody>
+          <a:bodyPr anchorCtr="0" anchor="t" bIns="91425" lIns="91425" rIns="91425" wrap="square" tIns="91425">
+            <a:noAutofit/>
+          </a:bodyPr>
+          <a:lstStyle/>
+          <a:p>
+            <a:pPr lvl="0" algn="ctr">
+              <a:spcBef>
+                <a:spcPts val="0"/>
+              </a:spcBef>
+              <a:buNone/>
+            </a:pPr>
+            <a:r>
+              <a:rPr lang="en-GB"/>
+              <a:t>Análisis</a:t>
+            </a:r>
+          </a:p>
+        </p:txBody>
+      </p:sp>
+      <p:sp>
+        <p:nvSpPr>
+          <p:cNvPr id="93" name="Shape 93"/>
+          <p:cNvSpPr txBox="1"/>
+          <p:nvPr>
+            <p:ph idx="1" type="body"/>
+          </p:nvPr>
+        </p:nvSpPr>
+        <p:spPr>
+          <a:xfrm>
+            <a:off x="311700" y="1152475"/>
+            <a:ext cx="8520600" cy="3416400"/>
+          </a:xfrm>
+          <a:prstGeom prst="rect">
+            <a:avLst/>
+          </a:prstGeom>
+        </p:spPr>
+        <p:txBody>
+          <a:bodyPr anchorCtr="0" anchor="t" bIns="91425" lIns="91425" rIns="91425" wrap="square" tIns="91425">
+            <a:noAutofit/>
+          </a:bodyPr>
+          <a:lstStyle/>
+          <a:p>
+            <a:pPr indent="-342900" lvl="0" marL="457200" rtl="0">
+              <a:spcBef>
+                <a:spcPts val="0"/>
+              </a:spcBef>
+              <a:spcAft>
+                <a:spcPts val="0"/>
+              </a:spcAft>
+              <a:buSzPts val="1800"/>
+              <a:buChar char="●"/>
+            </a:pPr>
+            <a:r>
+              <a:rPr lang="en-GB"/>
+              <a:t>Cuanto más grande son los números con los que trabajamos, más se puede apreciar la performance de rabin miller. Cuando el rango que se quiere trabajar es pequeño pero los números son grandes, rabin miller pareciera mejorar la mejor solución que teníamos de criba en rango.</a:t>
+            </a:r>
+          </a:p>
+          <a:p>
+            <a:pPr indent="-342900" lvl="0" marL="457200">
+              <a:spcBef>
+                <a:spcPts val="0"/>
+              </a:spcBef>
+              <a:buSzPts val="1800"/>
+              <a:buChar char="●"/>
+            </a:pPr>
+            <a:r>
+              <a:rPr lang="en-GB"/>
+              <a:t>Rabin miller es costoso por cada número, pero nos evita tener que calcular los primos hasta la </a:t>
+            </a:r>
+            <a:r>
+              <a:rPr lang="en-GB"/>
+              <a:t>raíz</a:t>
+            </a:r>
+            <a:r>
+              <a:rPr lang="en-GB"/>
+              <a:t> del rango con el que queremos trabajar. Dependiendo de con cuántos números </a:t>
+            </a:r>
+            <a:r>
+              <a:rPr lang="en-GB"/>
+              <a:t>trabajamos</a:t>
+            </a:r>
+            <a:r>
+              <a:rPr lang="en-GB"/>
+              <a:t> y en qué rango, puede convenir uno u otro algorimo</a:t>
+            </a:r>
+          </a:p>
+        </p:txBody>
+      </p:sp>
+    </p:spTree>
+  </p:cSld>
+  <p:clrMapOvr>
+    <a:masterClrMapping/>
+  </p:clrMapOvr>
+</p:sld>
+</file>
+
+<file path=ppt/slides/slide8.xml><?xml version="1.0" encoding="utf-8"?>
+<p:sld xmlns:a="http://schemas.openxmlformats.org/drawingml/2006/main" xmlns:r="http://schemas.openxmlformats.org/officeDocument/2006/relationships" xmlns:mc="http://schemas.openxmlformats.org/markup-compatibility/2006" xmlns:mv="urn:schemas-microsoft-com:mac:vml" xmlns:p="http://schemas.openxmlformats.org/presentationml/2006/main" xmlns:c="http://schemas.openxmlformats.org/drawingml/2006/chart" xmlns:dgm="http://schemas.openxmlformats.org/drawingml/2006/diagram" xmlns:o="urn:schemas-microsoft-com:office:office" xmlns:v="urn:schemas-microsoft-com:vml" xmlns:pvml="urn:schemas-microsoft-com:office:powerpoint" xmlns:com="http://schemas.openxmlformats.org/drawingml/2006/compatibility" xmlns:p14="http://schemas.microsoft.com/office/powerpoint/2010/main" xmlns:p15="http://schemas.microsoft.com/office/powerpoint/2012/main">
+  <p:cSld>
+    <p:spTree>
+      <p:nvGrpSpPr>
+        <p:cNvPr id="97" name="Shape 97"/>
+        <p:cNvGrpSpPr/>
+        <p:nvPr/>
+      </p:nvGrpSpPr>
+      <p:grpSpPr>
+        <a:xfrm>
+          <a:off x="0" y="0"/>
+          <a:ext cx="0" cy="0"/>
+          <a:chOff x="0" y="0"/>
+          <a:chExt cx="0" cy="0"/>
+        </a:xfrm>
+      </p:grpSpPr>
+      <p:sp>
+        <p:nvSpPr>
+          <p:cNvPr id="98" name="Shape 98"/>
+          <p:cNvSpPr txBox="1"/>
+          <p:nvPr>
+            <p:ph type="title"/>
+          </p:nvPr>
+        </p:nvSpPr>
+        <p:spPr>
+          <a:xfrm>
+            <a:off x="311700" y="445025"/>
+            <a:ext cx="8520600" cy="572700"/>
+          </a:xfrm>
+          <a:prstGeom prst="rect">
+            <a:avLst/>
+          </a:prstGeom>
+        </p:spPr>
+        <p:txBody>
+          <a:bodyPr anchorCtr="0" anchor="t" bIns="91425" lIns="91425" rIns="91425" wrap="square" tIns="91425">
+            <a:noAutofit/>
+          </a:bodyPr>
+          <a:lstStyle/>
+          <a:p>
+            <a:pPr lvl="0" algn="ctr">
+              <a:spcBef>
+                <a:spcPts val="0"/>
+              </a:spcBef>
+              <a:buNone/>
+            </a:pPr>
+            <a:r>
+              <a:rPr lang="en-GB"/>
+              <a:t>Propuesta</a:t>
+            </a:r>
+          </a:p>
+        </p:txBody>
+      </p:sp>
+      <p:sp>
+        <p:nvSpPr>
+          <p:cNvPr id="99" name="Shape 99"/>
+          <p:cNvSpPr txBox="1"/>
+          <p:nvPr>
+            <p:ph idx="1" type="body"/>
+          </p:nvPr>
+        </p:nvSpPr>
+        <p:spPr>
+          <a:xfrm>
+            <a:off x="311700" y="1152475"/>
+            <a:ext cx="8520600" cy="3416400"/>
+          </a:xfrm>
+          <a:prstGeom prst="rect">
+            <a:avLst/>
+          </a:prstGeom>
+        </p:spPr>
+        <p:txBody>
+          <a:bodyPr anchorCtr="0" anchor="t" bIns="91425" lIns="91425" rIns="91425" wrap="square" tIns="91425">
+            <a:noAutofit/>
+          </a:bodyPr>
+          <a:lstStyle/>
+          <a:p>
+            <a:pPr indent="-342900" lvl="0" marL="457200" rtl="0">
+              <a:spcBef>
+                <a:spcPts val="0"/>
+              </a:spcBef>
+              <a:spcAft>
+                <a:spcPts val="0"/>
+              </a:spcAft>
+              <a:buSzPts val="1800"/>
+              <a:buChar char="●"/>
+            </a:pPr>
+            <a:r>
+              <a:rPr lang="en-GB"/>
+              <a:t>Hacer algo que una los beneficios de ambos: bajo costo por número (criba) pero poder trabajar con números grandes sin demasiado overhead causado por los primos hasta la </a:t>
+            </a:r>
+            <a:r>
+              <a:rPr lang="en-GB"/>
+              <a:t>raíz</a:t>
+            </a:r>
+            <a:r>
+              <a:rPr lang="en-GB"/>
+              <a:t> (rabin miller)</a:t>
+            </a:r>
+          </a:p>
+          <a:p>
+            <a:pPr indent="-342900" lvl="0" marL="457200" rtl="0">
+              <a:spcBef>
+                <a:spcPts val="0"/>
+              </a:spcBef>
+              <a:spcAft>
+                <a:spcPts val="0"/>
+              </a:spcAft>
+              <a:buSzPts val="1800"/>
+              <a:buChar char="●"/>
+            </a:pPr>
+            <a:r>
+              <a:rPr lang="en-GB"/>
+              <a:t>Para esto hicimos un nuevo programa que combina ambas ideas: hace la criba igual que antes, pero en lugar de ir calcular los primos hasta la raíz del rango que necesitamos, se limita a cierto límite (seteado en 500000).</a:t>
+            </a:r>
+          </a:p>
+          <a:p>
+            <a:pPr indent="-342900" lvl="0" marL="457200" rtl="0">
+              <a:spcBef>
+                <a:spcPts val="0"/>
+              </a:spcBef>
+              <a:spcAft>
+                <a:spcPts val="0"/>
+              </a:spcAft>
+              <a:buSzPts val="1800"/>
+              <a:buChar char="●"/>
+            </a:pPr>
+            <a:r>
+              <a:rPr lang="en-GB"/>
+              <a:t>Si la criba nos dice que un número no es primo, no lo es</a:t>
+            </a:r>
+          </a:p>
+          <a:p>
+            <a:pPr indent="-342900" lvl="0" marL="457200">
+              <a:spcBef>
+                <a:spcPts val="0"/>
+              </a:spcBef>
+              <a:buSzPts val="1800"/>
+              <a:buChar char="●"/>
+            </a:pPr>
+            <a:r>
+              <a:rPr lang="en-GB"/>
+              <a:t>Si nos dice que sí lo es, puede ser un falso positivo ya que no tenemos todos los primos hasta la raíz. En estos casos aplicamos rabin miller para confirmar</a:t>
+            </a:r>
+          </a:p>
+        </p:txBody>
+      </p:sp>
+    </p:spTree>
+  </p:cSld>
+  <p:clrMapOvr>
+    <a:masterClrMapping/>
+  </p:clrMapOvr>
+</p:sld>
+</file>
+
+<file path=ppt/slides/slide9.xml><?xml version="1.0" encoding="utf-8"?>
+<p:sld xmlns:a="http://schemas.openxmlformats.org/drawingml/2006/main" xmlns:r="http://schemas.openxmlformats.org/officeDocument/2006/relationships" xmlns:mc="http://schemas.openxmlformats.org/markup-compatibility/2006" xmlns:mv="urn:schemas-microsoft-com:mac:vml" xmlns:p="http://schemas.openxmlformats.org/presentationml/2006/main" xmlns:c="http://schemas.openxmlformats.org/drawingml/2006/chart" xmlns:dgm="http://schemas.openxmlformats.org/drawingml/2006/diagram" xmlns:o="urn:schemas-microsoft-com:office:office" xmlns:v="urn:schemas-microsoft-com:vml" xmlns:pvml="urn:schemas-microsoft-com:office:powerpoint" xmlns:com="http://schemas.openxmlformats.org/drawingml/2006/compatibility" xmlns:p14="http://schemas.microsoft.com/office/powerpoint/2010/main" xmlns:p15="http://schemas.microsoft.com/office/powerpoint/2012/main">
+  <p:cSld>
+    <p:spTree>
+      <p:nvGrpSpPr>
+        <p:cNvPr id="103" name="Shape 103"/>
         <p:cNvGrpSpPr/>
         <p:nvPr/>
       </p:nvGrpSpPr>
@@ -5507,7 +7097,7 @@
       </p:grpSpPr>
       <p:pic>
         <p:nvPicPr>
-          <p:cNvPr id="74" name="Shape 74"/>
+          <p:cNvPr id="104" name="Shape 104"/>
           <p:cNvPicPr preferRelativeResize="0"/>
           <p:nvPr/>
         </p:nvPicPr>

</xml_diff>